<commit_message>
Indicatoren en taalfout in template aangepast
</commit_message>
<xml_diff>
--- a/oko/template rapportage oko.pptx
+++ b/oko/template rapportage oko.pptx
@@ -174,12 +174,12 @@
   <pc:docChgLst>
     <pc:chgData name="Vermeulen - van Gent, Sander" userId="e08259fd-81d2-4a86-9b20-28ba02d67a18" providerId="ADAL" clId="{CD1B3BBE-56CC-4974-BC5E-9FCD75B07556}"/>
     <pc:docChg chg="undo custSel addSld delSld modSld modMainMaster">
-      <pc:chgData name="Vermeulen - van Gent, Sander" userId="e08259fd-81d2-4a86-9b20-28ba02d67a18" providerId="ADAL" clId="{CD1B3BBE-56CC-4974-BC5E-9FCD75B07556}" dt="2025-12-16T19:43:15.367" v="2741" actId="20577"/>
+      <pc:chgData name="Vermeulen - van Gent, Sander" userId="e08259fd-81d2-4a86-9b20-28ba02d67a18" providerId="ADAL" clId="{CD1B3BBE-56CC-4974-BC5E-9FCD75B07556}" dt="2025-12-17T14:41:24.643" v="2759" actId="20577"/>
       <pc:docMkLst>
         <pc:docMk/>
       </pc:docMkLst>
       <pc:sldMasterChg chg="addSldLayout modSldLayout">
-        <pc:chgData name="Vermeulen - van Gent, Sander" userId="e08259fd-81d2-4a86-9b20-28ba02d67a18" providerId="ADAL" clId="{CD1B3BBE-56CC-4974-BC5E-9FCD75B07556}" dt="2025-12-16T19:43:15.367" v="2741" actId="20577"/>
+        <pc:chgData name="Vermeulen - van Gent, Sander" userId="e08259fd-81d2-4a86-9b20-28ba02d67a18" providerId="ADAL" clId="{CD1B3BBE-56CC-4974-BC5E-9FCD75B07556}" dt="2025-12-17T14:41:24.643" v="2759" actId="20577"/>
         <pc:sldMasterMkLst>
           <pc:docMk/>
           <pc:sldMasterMk cId="582609979" sldId="2147483648"/>
@@ -491,7 +491,7 @@
           </pc:spChg>
         </pc:sldLayoutChg>
         <pc:sldLayoutChg chg="addSp modSp mod">
-          <pc:chgData name="Vermeulen - van Gent, Sander" userId="e08259fd-81d2-4a86-9b20-28ba02d67a18" providerId="ADAL" clId="{CD1B3BBE-56CC-4974-BC5E-9FCD75B07556}" dt="2025-11-27T13:37:49.237" v="2721" actId="1076"/>
+          <pc:chgData name="Vermeulen - van Gent, Sander" userId="e08259fd-81d2-4a86-9b20-28ba02d67a18" providerId="ADAL" clId="{CD1B3BBE-56CC-4974-BC5E-9FCD75B07556}" dt="2025-12-17T14:41:24.643" v="2759" actId="20577"/>
           <pc:sldLayoutMkLst>
             <pc:docMk/>
             <pc:sldMasterMk cId="582609979" sldId="2147483648"/>
@@ -516,7 +516,7 @@
             </ac:spMkLst>
           </pc:spChg>
           <pc:spChg chg="mod">
-            <ac:chgData name="Vermeulen - van Gent, Sander" userId="e08259fd-81d2-4a86-9b20-28ba02d67a18" providerId="ADAL" clId="{CD1B3BBE-56CC-4974-BC5E-9FCD75B07556}" dt="2025-11-20T11:55:27.959" v="2607"/>
+            <ac:chgData name="Vermeulen - van Gent, Sander" userId="e08259fd-81d2-4a86-9b20-28ba02d67a18" providerId="ADAL" clId="{CD1B3BBE-56CC-4974-BC5E-9FCD75B07556}" dt="2025-12-17T14:41:24.643" v="2759" actId="20577"/>
             <ac:spMkLst>
               <pc:docMk/>
               <pc:sldMasterMk cId="582609979" sldId="2147483648"/>
@@ -695,7 +695,7 @@
           <a:p>
             <a:fld id="{BBEDBBAB-6028-4680-9556-A8238B314949}" type="datetimeFigureOut">
               <a:rPr lang="nl-NL" smtClean="0"/>
-              <a:t>16-12-2025</a:t>
+              <a:t>17-12-2025</a:t>
             </a:fld>
             <a:endParaRPr lang="nl-NL"/>
           </a:p>
@@ -871,7 +871,7 @@
           </a:lstStyle>
           <a:p>
             <a:fld id="{37F81271-B6F7-4A7E-8F6C-1E1DF4AA2733}" type="datetimeFigureOut">
-              <a:t>16-12-2025</a:t>
+              <a:t>17-12-2025</a:t>
             </a:fld>
             <a:endParaRPr lang="nl-NL"/>
           </a:p>
@@ -12956,7 +12956,7 @@
             <a:pPr marL="0" lvl="0" defTabSz="839852"/>
             <a:r>
               <a:rPr lang="nl-NL" dirty="0"/>
-              <a:t>De houding van ouders ten opzichte van hangt samen met het alcoholgebruik van jongeren. Van de jongeren die geen (of alleen een slokje) alcohol drinken geeft xx% aan dat hun ouders het goed zouden vinden als ze toch alcohol zouden drinken. Van de jongeren die alcohol drinken geeft xx% aan dat hun ouders alcohol drinken goed vinden.</a:t>
+              <a:t>De houding van ouders ten opzichte van alcohol hangt samen met het alcoholgebruik van jongeren. Van de jongeren die geen (of alleen een slokje) alcohol drinken geeft xx% aan dat hun ouders het goed zouden vinden als ze toch alcohol zouden drinken. Van de jongeren die alcohol drinken geeft xx% aan dat hun ouders alcohol drinken goed vinden.</a:t>
             </a:r>
           </a:p>
         </p:txBody>
@@ -17794,6 +17794,22 @@
 </file>
 
 <file path=customXml/item1.xml><?xml version="1.0" encoding="utf-8"?>
+<p:properties xmlns:p="http://schemas.microsoft.com/office/2006/metadata/properties" xmlns:xsi="http://www.w3.org/2001/XMLSchema-instance" xmlns:pc="http://schemas.microsoft.com/office/infopath/2007/PartnerControls">
+  <documentManagement>
+    <_ip_UnifiedCompliancePolicyUIAction xmlns="http://schemas.microsoft.com/sharepoint/v3" xsi:nil="true"/>
+    <lcf76f155ced4ddcb4097134ff3c332f xmlns="4e95bed8-6d15-4403-ad70-a53422338dca">
+      <Terms xmlns="http://schemas.microsoft.com/office/infopath/2007/PartnerControls"/>
+    </lcf76f155ced4ddcb4097134ff3c332f>
+    <_ip_UnifiedCompliancePolicyProperties xmlns="http://schemas.microsoft.com/sharepoint/v3" xsi:nil="true"/>
+    <TaxCatchAll xmlns="d045ab76-3bb7-45f5-ab41-d7b04aa0dc94" xsi:nil="true"/>
+    <TaxKeywordTaxHTField xmlns="d045ab76-3bb7-45f5-ab41-d7b04aa0dc94">
+      <Terms xmlns="http://schemas.microsoft.com/office/infopath/2007/PartnerControls"/>
+    </TaxKeywordTaxHTField>
+  </documentManagement>
+</p:properties>
+</file>
+
+<file path=customXml/item2.xml><?xml version="1.0" encoding="utf-8"?>
 <ct:contentTypeSchema xmlns:ct="http://schemas.microsoft.com/office/2006/metadata/contentType" xmlns:ma="http://schemas.microsoft.com/office/2006/metadata/properties/metaAttributes" ct:_="" ma:_="" ma:contentTypeName="Document" ma:contentTypeID="0x010100C4EA295FB1FB9547A73C9F5819D6E613" ma:contentTypeVersion="22" ma:contentTypeDescription="Een nieuw document maken." ma:contentTypeScope="" ma:versionID="e49181b65574406c5282aee675d2d615">
   <xsd:schema xmlns:xsd="http://www.w3.org/2001/XMLSchema" xmlns:xs="http://www.w3.org/2001/XMLSchema" xmlns:p="http://schemas.microsoft.com/office/2006/metadata/properties" xmlns:ns1="http://schemas.microsoft.com/sharepoint/v3" xmlns:ns2="4e95bed8-6d15-4403-ad70-a53422338dca" xmlns:ns3="10d3344f-2d16-43d9-a145-97142f5cb288" xmlns:ns4="d045ab76-3bb7-45f5-ab41-d7b04aa0dc94" targetNamespace="http://schemas.microsoft.com/office/2006/metadata/properties" ma:root="true" ma:fieldsID="cc6d884b6a76c93e77d17ea8b02330de" ns1:_="" ns2:_="" ns3:_="" ns4:_="">
     <xsd:import namespace="http://schemas.microsoft.com/sharepoint/v3"/>
@@ -18078,22 +18094,6 @@
 </ct:contentTypeSchema>
 </file>
 
-<file path=customXml/item2.xml><?xml version="1.0" encoding="utf-8"?>
-<p:properties xmlns:p="http://schemas.microsoft.com/office/2006/metadata/properties" xmlns:xsi="http://www.w3.org/2001/XMLSchema-instance" xmlns:pc="http://schemas.microsoft.com/office/infopath/2007/PartnerControls">
-  <documentManagement>
-    <_ip_UnifiedCompliancePolicyUIAction xmlns="http://schemas.microsoft.com/sharepoint/v3" xsi:nil="true"/>
-    <lcf76f155ced4ddcb4097134ff3c332f xmlns="4e95bed8-6d15-4403-ad70-a53422338dca">
-      <Terms xmlns="http://schemas.microsoft.com/office/infopath/2007/PartnerControls"/>
-    </lcf76f155ced4ddcb4097134ff3c332f>
-    <_ip_UnifiedCompliancePolicyProperties xmlns="http://schemas.microsoft.com/sharepoint/v3" xsi:nil="true"/>
-    <TaxCatchAll xmlns="d045ab76-3bb7-45f5-ab41-d7b04aa0dc94" xsi:nil="true"/>
-    <TaxKeywordTaxHTField xmlns="d045ab76-3bb7-45f5-ab41-d7b04aa0dc94">
-      <Terms xmlns="http://schemas.microsoft.com/office/infopath/2007/PartnerControls"/>
-    </TaxKeywordTaxHTField>
-  </documentManagement>
-</p:properties>
-</file>
-
 <file path=customXml/item3.xml><?xml version="1.0" encoding="utf-8"?>
 <?mso-contentType ?>
 <FormTemplates xmlns="http://schemas.microsoft.com/sharepoint/v3/contenttype/forms">
@@ -18104,6 +18104,25 @@
 </file>
 
 <file path=customXml/itemProps1.xml><?xml version="1.0" encoding="utf-8"?>
+<ds:datastoreItem xmlns:ds="http://schemas.openxmlformats.org/officeDocument/2006/customXml" ds:itemID="{428373FD-713A-4C43-B3FE-80F0E3D63506}">
+  <ds:schemaRefs>
+    <ds:schemaRef ds:uri="http://schemas.microsoft.com/office/2006/documentManagement/types"/>
+    <ds:schemaRef ds:uri="http://purl.org/dc/terms/"/>
+    <ds:schemaRef ds:uri="http://www.w3.org/XML/1998/namespace"/>
+    <ds:schemaRef ds:uri="http://schemas.microsoft.com/office/2006/metadata/properties"/>
+    <ds:schemaRef ds:uri="http://schemas.openxmlformats.org/package/2006/metadata/core-properties"/>
+    <ds:schemaRef ds:uri="http://schemas.microsoft.com/office/infopath/2007/PartnerControls"/>
+    <ds:schemaRef ds:uri="c1085ce0-992b-4e2c-bc8b-9e7e29361dd3"/>
+    <ds:schemaRef ds:uri="http://purl.org/dc/dcmitype/"/>
+    <ds:schemaRef ds:uri="http://purl.org/dc/elements/1.1/"/>
+    <ds:schemaRef ds:uri="http://schemas.microsoft.com/sharepoint/v3"/>
+    <ds:schemaRef ds:uri="4e95bed8-6d15-4403-ad70-a53422338dca"/>
+    <ds:schemaRef ds:uri="d045ab76-3bb7-45f5-ab41-d7b04aa0dc94"/>
+  </ds:schemaRefs>
+</ds:datastoreItem>
+</file>
+
+<file path=customXml/itemProps2.xml><?xml version="1.0" encoding="utf-8"?>
 <ds:datastoreItem xmlns:ds="http://schemas.openxmlformats.org/officeDocument/2006/customXml" ds:itemID="{4F1CF73A-4EA0-4141-87E3-9F6DA2499A43}">
   <ds:schemaRefs>
     <ds:schemaRef ds:uri="http://schemas.microsoft.com/office/2006/metadata/contentType"/>
@@ -18124,25 +18143,6 @@
 </ds:datastoreItem>
 </file>
 
-<file path=customXml/itemProps2.xml><?xml version="1.0" encoding="utf-8"?>
-<ds:datastoreItem xmlns:ds="http://schemas.openxmlformats.org/officeDocument/2006/customXml" ds:itemID="{428373FD-713A-4C43-B3FE-80F0E3D63506}">
-  <ds:schemaRefs>
-    <ds:schemaRef ds:uri="http://schemas.microsoft.com/office/2006/documentManagement/types"/>
-    <ds:schemaRef ds:uri="http://purl.org/dc/terms/"/>
-    <ds:schemaRef ds:uri="http://www.w3.org/XML/1998/namespace"/>
-    <ds:schemaRef ds:uri="http://schemas.microsoft.com/office/2006/metadata/properties"/>
-    <ds:schemaRef ds:uri="http://schemas.openxmlformats.org/package/2006/metadata/core-properties"/>
-    <ds:schemaRef ds:uri="http://schemas.microsoft.com/office/infopath/2007/PartnerControls"/>
-    <ds:schemaRef ds:uri="c1085ce0-992b-4e2c-bc8b-9e7e29361dd3"/>
-    <ds:schemaRef ds:uri="http://purl.org/dc/dcmitype/"/>
-    <ds:schemaRef ds:uri="http://purl.org/dc/elements/1.1/"/>
-    <ds:schemaRef ds:uri="http://schemas.microsoft.com/sharepoint/v3"/>
-    <ds:schemaRef ds:uri="4e95bed8-6d15-4403-ad70-a53422338dca"/>
-    <ds:schemaRef ds:uri="d045ab76-3bb7-45f5-ab41-d7b04aa0dc94"/>
-  </ds:schemaRefs>
-</ds:datastoreItem>
-</file>
-
 <file path=customXml/itemProps3.xml><?xml version="1.0" encoding="utf-8"?>
 <ds:datastoreItem xmlns:ds="http://schemas.openxmlformats.org/officeDocument/2006/customXml" ds:itemID="{D4797234-1F06-4080-A1F9-30DCE4CF2F06}">
   <ds:schemaRefs>

</xml_diff>